<commit_message>
puliendo los ultimos detalles
</commit_message>
<xml_diff>
--- a/docs/presentacion.pptx
+++ b/docs/presentacion.pptx
@@ -9407,7 +9407,22 @@
                 <a:latin typeface="Cambria" panose="02040503050406030204" pitchFamily="18" charset="0"/>
                 <a:ea typeface="Cambria" panose="02040503050406030204" pitchFamily="18" charset="0"/>
               </a:rPr>
-              <a:t>El país de Guinea Ecuatorial carece de clínicas especializadas en servicios oftalmólogos, y teniendo en cuenta que en Guinea Ecuatorial el acceso a internet y el uso de teléfonos móviles es cada vez mayor, la clínica PLAyANA ha decidió crear una plataforma web, para ofrecer información, servicios y atención personalizada a sus pacientes</a:t>
+              <a:t>El país de Guinea Ecuatorial carece de clínicas especializadas en servicios oftalmólogos, y teniendo en cuenta que en Guinea Ecuatorial el acceso a internet y el uso de teléfonos móviles es cada vez mayor, la clínica PLAyANA crear</a:t>
+            </a:r>
+            <a:r>
+              <a:rPr lang="es-ES" sz="2400" dirty="0">
+                <a:latin typeface="Cambria" panose="02040503050406030204" pitchFamily="18" charset="0"/>
+                <a:ea typeface="Cambria" panose="02040503050406030204" pitchFamily="18" charset="0"/>
+              </a:rPr>
+              <a:t>á</a:t>
+            </a:r>
+            <a:r>
+              <a:rPr lang="es-ES" sz="2400" dirty="0">
+                <a:effectLst/>
+                <a:latin typeface="Cambria" panose="02040503050406030204" pitchFamily="18" charset="0"/>
+                <a:ea typeface="Cambria" panose="02040503050406030204" pitchFamily="18" charset="0"/>
+              </a:rPr>
+              <a:t> una plataforma web, para ofrecer información, servicios y atención personalizada a sus pacientes</a:t>
             </a:r>
           </a:p>
         </p:txBody>

</xml_diff>